<commit_message>
seperated labels variable to file
</commit_message>
<xml_diff>
--- a/diagram/system model.pptx
+++ b/diagram/system model.pptx
@@ -259,7 +259,7 @@
           <a:p>
             <a:fld id="{DAC97E7F-255A-B348-88AF-C1D19B7D5507}" type="datetimeFigureOut">
               <a:rPr lang="en-US" smtClean="0"/>
-              <a:t>7/13/23</a:t>
+              <a:t>7/14/23</a:t>
             </a:fld>
             <a:endParaRPr lang="en-US"/>
           </a:p>
@@ -457,7 +457,7 @@
           <a:p>
             <a:fld id="{DAC97E7F-255A-B348-88AF-C1D19B7D5507}" type="datetimeFigureOut">
               <a:rPr lang="en-US" smtClean="0"/>
-              <a:t>7/13/23</a:t>
+              <a:t>7/14/23</a:t>
             </a:fld>
             <a:endParaRPr lang="en-US"/>
           </a:p>
@@ -665,7 +665,7 @@
           <a:p>
             <a:fld id="{DAC97E7F-255A-B348-88AF-C1D19B7D5507}" type="datetimeFigureOut">
               <a:rPr lang="en-US" smtClean="0"/>
-              <a:t>7/13/23</a:t>
+              <a:t>7/14/23</a:t>
             </a:fld>
             <a:endParaRPr lang="en-US"/>
           </a:p>
@@ -863,7 +863,7 @@
           <a:p>
             <a:fld id="{DAC97E7F-255A-B348-88AF-C1D19B7D5507}" type="datetimeFigureOut">
               <a:rPr lang="en-US" smtClean="0"/>
-              <a:t>7/13/23</a:t>
+              <a:t>7/14/23</a:t>
             </a:fld>
             <a:endParaRPr lang="en-US"/>
           </a:p>
@@ -1138,7 +1138,7 @@
           <a:p>
             <a:fld id="{DAC97E7F-255A-B348-88AF-C1D19B7D5507}" type="datetimeFigureOut">
               <a:rPr lang="en-US" smtClean="0"/>
-              <a:t>7/13/23</a:t>
+              <a:t>7/14/23</a:t>
             </a:fld>
             <a:endParaRPr lang="en-US"/>
           </a:p>
@@ -1403,7 +1403,7 @@
           <a:p>
             <a:fld id="{DAC97E7F-255A-B348-88AF-C1D19B7D5507}" type="datetimeFigureOut">
               <a:rPr lang="en-US" smtClean="0"/>
-              <a:t>7/13/23</a:t>
+              <a:t>7/14/23</a:t>
             </a:fld>
             <a:endParaRPr lang="en-US"/>
           </a:p>
@@ -1815,7 +1815,7 @@
           <a:p>
             <a:fld id="{DAC97E7F-255A-B348-88AF-C1D19B7D5507}" type="datetimeFigureOut">
               <a:rPr lang="en-US" smtClean="0"/>
-              <a:t>7/13/23</a:t>
+              <a:t>7/14/23</a:t>
             </a:fld>
             <a:endParaRPr lang="en-US"/>
           </a:p>
@@ -1956,7 +1956,7 @@
           <a:p>
             <a:fld id="{DAC97E7F-255A-B348-88AF-C1D19B7D5507}" type="datetimeFigureOut">
               <a:rPr lang="en-US" smtClean="0"/>
-              <a:t>7/13/23</a:t>
+              <a:t>7/14/23</a:t>
             </a:fld>
             <a:endParaRPr lang="en-US"/>
           </a:p>
@@ -2069,7 +2069,7 @@
           <a:p>
             <a:fld id="{DAC97E7F-255A-B348-88AF-C1D19B7D5507}" type="datetimeFigureOut">
               <a:rPr lang="en-US" smtClean="0"/>
-              <a:t>7/13/23</a:t>
+              <a:t>7/14/23</a:t>
             </a:fld>
             <a:endParaRPr lang="en-US"/>
           </a:p>
@@ -2380,7 +2380,7 @@
           <a:p>
             <a:fld id="{DAC97E7F-255A-B348-88AF-C1D19B7D5507}" type="datetimeFigureOut">
               <a:rPr lang="en-US" smtClean="0"/>
-              <a:t>7/13/23</a:t>
+              <a:t>7/14/23</a:t>
             </a:fld>
             <a:endParaRPr lang="en-US"/>
           </a:p>
@@ -2668,7 +2668,7 @@
           <a:p>
             <a:fld id="{DAC97E7F-255A-B348-88AF-C1D19B7D5507}" type="datetimeFigureOut">
               <a:rPr lang="en-US" smtClean="0"/>
-              <a:t>7/13/23</a:t>
+              <a:t>7/14/23</a:t>
             </a:fld>
             <a:endParaRPr lang="en-US"/>
           </a:p>
@@ -2909,7 +2909,7 @@
           <a:p>
             <a:fld id="{DAC97E7F-255A-B348-88AF-C1D19B7D5507}" type="datetimeFigureOut">
               <a:rPr lang="en-US" smtClean="0"/>
-              <a:t>7/13/23</a:t>
+              <a:t>7/14/23</a:t>
             </a:fld>
             <a:endParaRPr lang="en-US"/>
           </a:p>
@@ -3340,8 +3340,8 @@
         </p:nvSpPr>
         <p:spPr>
           <a:xfrm>
-            <a:off x="4907789" y="250814"/>
-            <a:ext cx="1853206" cy="631178"/>
+            <a:off x="4864596" y="628461"/>
+            <a:ext cx="2072231" cy="800070"/>
           </a:xfrm>
           <a:prstGeom prst="rect">
             <a:avLst/>
@@ -3378,7 +3378,7 @@
           <a:p>
             <a:pPr algn="ctr"/>
             <a:r>
-              <a:rPr lang="en-US" dirty="0">
+              <a:rPr lang="en-US" sz="2000" dirty="0">
                 <a:solidFill>
                   <a:schemeClr val="tx1"/>
                 </a:solidFill>
@@ -3389,12 +3389,12 @@
           <a:p>
             <a:pPr algn="ctr"/>
             <a:r>
-              <a:rPr lang="en-US" dirty="0">
+              <a:rPr lang="en-US" sz="2000" dirty="0">
                 <a:solidFill>
                   <a:schemeClr val="tx1"/>
                 </a:solidFill>
               </a:rPr>
-              <a:t>69,998</a:t>
+              <a:t>259,998</a:t>
             </a:r>
           </a:p>
         </p:txBody>
@@ -3413,8 +3413,8 @@
         </p:nvSpPr>
         <p:spPr>
           <a:xfrm>
-            <a:off x="5961037" y="2172344"/>
-            <a:ext cx="3850606" cy="307777"/>
+            <a:off x="5181025" y="3083536"/>
+            <a:ext cx="4404407" cy="584775"/>
           </a:xfrm>
           <a:prstGeom prst="rect">
             <a:avLst/>
@@ -3422,15 +3422,22 @@
           <a:noFill/>
         </p:spPr>
         <p:txBody>
-          <a:bodyPr wrap="none" rtlCol="0">
+          <a:bodyPr wrap="square" rtlCol="0">
             <a:spAutoFit/>
           </a:bodyPr>
           <a:lstStyle/>
           <a:p>
             <a:pPr algn="ctr"/>
             <a:r>
-              <a:rPr lang="en-US" sz="1400" dirty="0"/>
-              <a:t>Select 1000 samples randomly per reference point</a:t>
+              <a:rPr lang="en-US" sz="1600" dirty="0"/>
+              <a:t>Select 1000 samples randomly </a:t>
+            </a:r>
+            <a:br>
+              <a:rPr lang="en-US" sz="1600" dirty="0"/>
+            </a:br>
+            <a:r>
+              <a:rPr lang="en-US" sz="1600" dirty="0"/>
+              <a:t>per reference point</a:t>
             </a:r>
           </a:p>
         </p:txBody>
@@ -3449,8 +3456,8 @@
         </p:nvSpPr>
         <p:spPr>
           <a:xfrm>
-            <a:off x="4902534" y="2607299"/>
-            <a:ext cx="1853206" cy="631178"/>
+            <a:off x="4859341" y="3804746"/>
+            <a:ext cx="2072231" cy="800070"/>
           </a:xfrm>
           <a:prstGeom prst="rect">
             <a:avLst/>
@@ -3487,7 +3494,7 @@
           <a:p>
             <a:pPr algn="ctr"/>
             <a:r>
-              <a:rPr lang="en-US" dirty="0">
+              <a:rPr lang="en-US" sz="2000" dirty="0">
                 <a:solidFill>
                   <a:schemeClr val="tx1"/>
                 </a:solidFill>
@@ -3498,12 +3505,12 @@
           <a:p>
             <a:pPr algn="ctr"/>
             <a:r>
-              <a:rPr lang="en-US" dirty="0">
+              <a:rPr lang="en-US" sz="2000" dirty="0">
                 <a:solidFill>
                   <a:schemeClr val="tx1"/>
                 </a:solidFill>
               </a:rPr>
-              <a:t>17,501</a:t>
+              <a:t>35,000</a:t>
             </a:r>
           </a:p>
         </p:txBody>
@@ -3522,8 +3529,8 @@
         </p:nvSpPr>
         <p:spPr>
           <a:xfrm>
-            <a:off x="4906639" y="1430180"/>
-            <a:ext cx="1853206" cy="631178"/>
+            <a:off x="4863446" y="2165177"/>
+            <a:ext cx="2072231" cy="800070"/>
           </a:xfrm>
           <a:prstGeom prst="rect">
             <a:avLst/>
@@ -3560,7 +3567,7 @@
           <a:p>
             <a:pPr algn="ctr"/>
             <a:r>
-              <a:rPr lang="en-US" dirty="0">
+              <a:rPr lang="en-US" sz="2000" dirty="0">
                 <a:solidFill>
                   <a:schemeClr val="tx1"/>
                 </a:solidFill>
@@ -3571,12 +3578,12 @@
           <a:p>
             <a:pPr algn="ctr"/>
             <a:r>
-              <a:rPr lang="en-US" dirty="0">
+              <a:rPr lang="en-US" sz="2000" dirty="0">
                 <a:solidFill>
                   <a:schemeClr val="tx1"/>
                 </a:solidFill>
               </a:rPr>
-              <a:t>63,641</a:t>
+              <a:t>238,010</a:t>
             </a:r>
           </a:p>
         </p:txBody>
@@ -3597,8 +3604,8 @@
         </p:nvCxnSpPr>
         <p:spPr>
           <a:xfrm>
-            <a:off x="5834392" y="945933"/>
-            <a:ext cx="0" cy="420414"/>
+            <a:off x="5854260" y="1493575"/>
+            <a:ext cx="0" cy="587475"/>
           </a:xfrm>
           <a:prstGeom prst="straightConnector1">
             <a:avLst/>
@@ -3636,8 +3643,8 @@
         </p:nvSpPr>
         <p:spPr>
           <a:xfrm>
-            <a:off x="5933819" y="998375"/>
-            <a:ext cx="3905043" cy="307777"/>
+            <a:off x="5964938" y="1623402"/>
+            <a:ext cx="1883944" cy="338554"/>
           </a:xfrm>
           <a:prstGeom prst="rect">
             <a:avLst/>
@@ -3645,15 +3652,15 @@
           <a:noFill/>
         </p:spPr>
         <p:txBody>
-          <a:bodyPr wrap="none" rtlCol="0">
+          <a:bodyPr wrap="square" rtlCol="0">
             <a:spAutoFit/>
           </a:bodyPr>
           <a:lstStyle/>
           <a:p>
             <a:pPr algn="ctr"/>
             <a:r>
-              <a:rPr lang="en-US" sz="1400" dirty="0"/>
-              <a:t>Replace RSSI value that is less than -100 with -100</a:t>
+              <a:rPr lang="en-US" sz="1600" dirty="0"/>
+              <a:t>Apply 3-sigma cutoff</a:t>
             </a:r>
           </a:p>
         </p:txBody>
@@ -3672,8 +3679,8 @@
         </p:nvSpPr>
         <p:spPr>
           <a:xfrm>
-            <a:off x="3935900" y="3786665"/>
-            <a:ext cx="1853206" cy="631178"/>
+            <a:off x="3724546" y="5362480"/>
+            <a:ext cx="2072231" cy="800070"/>
           </a:xfrm>
           <a:prstGeom prst="rect">
             <a:avLst/>
@@ -3710,7 +3717,7 @@
           <a:p>
             <a:pPr algn="ctr"/>
             <a:r>
-              <a:rPr lang="en-US" dirty="0">
+              <a:rPr lang="en-US" sz="2000" dirty="0">
                 <a:solidFill>
                   <a:schemeClr val="tx1"/>
                 </a:solidFill>
@@ -3721,12 +3728,12 @@
           <a:p>
             <a:pPr algn="ctr"/>
             <a:r>
-              <a:rPr lang="en-US" dirty="0">
+              <a:rPr lang="en-US" sz="2000" dirty="0">
                 <a:solidFill>
                   <a:schemeClr val="tx1"/>
                 </a:solidFill>
               </a:rPr>
-              <a:t>11,900</a:t>
+              <a:t>24,500</a:t>
             </a:r>
           </a:p>
         </p:txBody>
@@ -3745,8 +3752,8 @@
         </p:nvSpPr>
         <p:spPr>
           <a:xfrm>
-            <a:off x="5929577" y="3786665"/>
-            <a:ext cx="1853206" cy="631178"/>
+            <a:off x="5938934" y="5362480"/>
+            <a:ext cx="2072231" cy="800070"/>
           </a:xfrm>
           <a:prstGeom prst="rect">
             <a:avLst/>
@@ -3783,7 +3790,7 @@
           <a:p>
             <a:pPr algn="ctr"/>
             <a:r>
-              <a:rPr lang="en-US" dirty="0">
+              <a:rPr lang="en-US" sz="2000" dirty="0">
                 <a:solidFill>
                   <a:schemeClr val="tx1"/>
                 </a:solidFill>
@@ -3794,12 +3801,12 @@
           <a:p>
             <a:pPr algn="ctr"/>
             <a:r>
-              <a:rPr lang="en-US" dirty="0">
+              <a:rPr lang="en-US" sz="2000" dirty="0">
                 <a:solidFill>
                   <a:schemeClr val="tx1"/>
                 </a:solidFill>
               </a:rPr>
-              <a:t>5,601</a:t>
+              <a:t>10,500</a:t>
             </a:r>
           </a:p>
         </p:txBody>
@@ -3818,8 +3825,8 @@
         </p:nvSpPr>
         <p:spPr>
           <a:xfrm>
-            <a:off x="6771378" y="3353392"/>
-            <a:ext cx="1308693" cy="307777"/>
+            <a:off x="6782188" y="4765539"/>
+            <a:ext cx="1463364" cy="338554"/>
           </a:xfrm>
           <a:prstGeom prst="rect">
             <a:avLst/>
@@ -3827,14 +3834,14 @@
           <a:noFill/>
         </p:spPr>
         <p:txBody>
-          <a:bodyPr wrap="none" rtlCol="0">
+          <a:bodyPr wrap="square" rtlCol="0">
             <a:spAutoFit/>
           </a:bodyPr>
           <a:lstStyle/>
           <a:p>
             <a:pPr algn="ctr"/>
             <a:r>
-              <a:rPr lang="en-US" sz="1400" dirty="0"/>
+              <a:rPr lang="en-US" sz="1600" dirty="0"/>
               <a:t>30% Testing set</a:t>
             </a:r>
           </a:p>
@@ -3854,8 +3861,8 @@
         </p:nvSpPr>
         <p:spPr>
           <a:xfrm>
-            <a:off x="3480752" y="3325236"/>
-            <a:ext cx="1375954" cy="307777"/>
+            <a:off x="3470475" y="4768840"/>
+            <a:ext cx="1538574" cy="338554"/>
           </a:xfrm>
           <a:prstGeom prst="rect">
             <a:avLst/>
@@ -3863,14 +3870,14 @@
           <a:noFill/>
         </p:spPr>
         <p:txBody>
-          <a:bodyPr wrap="none" rtlCol="0">
+          <a:bodyPr wrap="square" rtlCol="0">
             <a:spAutoFit/>
           </a:bodyPr>
           <a:lstStyle/>
           <a:p>
             <a:pPr algn="ctr"/>
             <a:r>
-              <a:rPr lang="en-US" sz="1400" dirty="0"/>
+              <a:rPr lang="en-US" sz="1600" dirty="0"/>
               <a:t>70% Training set</a:t>
             </a:r>
           </a:p>
@@ -3892,8 +3899,8 @@
         </p:nvCxnSpPr>
         <p:spPr>
           <a:xfrm>
-            <a:off x="5829137" y="2111799"/>
-            <a:ext cx="0" cy="420414"/>
+            <a:off x="5859514" y="3051270"/>
+            <a:ext cx="0" cy="587475"/>
           </a:xfrm>
           <a:prstGeom prst="straightConnector1">
             <a:avLst/>
@@ -3933,8 +3940,8 @@
         </p:nvCxnSpPr>
         <p:spPr>
           <a:xfrm flipH="1">
-            <a:off x="4998051" y="3325236"/>
-            <a:ext cx="646004" cy="364090"/>
+            <a:off x="4933839" y="4751761"/>
+            <a:ext cx="741749" cy="430027"/>
           </a:xfrm>
           <a:prstGeom prst="straightConnector1">
             <a:avLst/>
@@ -3960,10 +3967,10 @@
       </p:cxnSp>
       <p:cxnSp>
         <p:nvCxnSpPr>
-          <p:cNvPr id="30" name="Straight Arrow Connector 29">
-            <a:extLst>
-              <a:ext uri="{FF2B5EF4-FFF2-40B4-BE49-F238E27FC236}">
-                <a16:creationId xmlns:a16="http://schemas.microsoft.com/office/drawing/2014/main" id="{B90746B0-5CBA-904E-051B-F140CC02FD70}"/>
+          <p:cNvPr id="9" name="Straight Arrow Connector 8">
+            <a:extLst>
+              <a:ext uri="{FF2B5EF4-FFF2-40B4-BE49-F238E27FC236}">
+                <a16:creationId xmlns:a16="http://schemas.microsoft.com/office/drawing/2014/main" id="{A9AEC666-F1A1-26FF-CFA6-73D4857DE396}"/>
               </a:ext>
             </a:extLst>
           </p:cNvPr>
@@ -3974,214 +3981,8 @@
         </p:nvCxnSpPr>
         <p:spPr>
           <a:xfrm>
-            <a:off x="6096000" y="3325235"/>
-            <a:ext cx="646004" cy="364090"/>
-          </a:xfrm>
-          <a:prstGeom prst="straightConnector1">
-            <a:avLst/>
-          </a:prstGeom>
-          <a:ln>
-            <a:tailEnd type="triangle"/>
-          </a:ln>
-        </p:spPr>
-        <p:style>
-          <a:lnRef idx="1">
-            <a:schemeClr val="accent1"/>
-          </a:lnRef>
-          <a:fillRef idx="0">
-            <a:schemeClr val="accent1"/>
-          </a:fillRef>
-          <a:effectRef idx="0">
-            <a:schemeClr val="accent1"/>
-          </a:effectRef>
-          <a:fontRef idx="minor">
-            <a:schemeClr val="tx1"/>
-          </a:fontRef>
-        </p:style>
-      </p:cxnSp>
-      <p:sp>
-        <p:nvSpPr>
-          <p:cNvPr id="31" name="Rectangle 30">
-            <a:extLst>
-              <a:ext uri="{FF2B5EF4-FFF2-40B4-BE49-F238E27FC236}">
-                <a16:creationId xmlns:a16="http://schemas.microsoft.com/office/drawing/2014/main" id="{E23EDC00-BCB1-6784-8225-2EBDA0AB322C}"/>
-              </a:ext>
-            </a:extLst>
-          </p:cNvPr>
-          <p:cNvSpPr/>
-          <p:nvPr/>
-        </p:nvSpPr>
-        <p:spPr>
-          <a:xfrm>
-            <a:off x="3896157" y="4963784"/>
-            <a:ext cx="1853206" cy="631178"/>
-          </a:xfrm>
-          <a:prstGeom prst="rect">
-            <a:avLst/>
-          </a:prstGeom>
-          <a:noFill/>
-          <a:ln>
-            <a:solidFill>
-              <a:schemeClr val="accent1">
-                <a:lumMod val="60000"/>
-                <a:lumOff val="40000"/>
-              </a:schemeClr>
-            </a:solidFill>
-          </a:ln>
-        </p:spPr>
-        <p:style>
-          <a:lnRef idx="2">
-            <a:schemeClr val="accent1">
-              <a:shade val="15000"/>
-            </a:schemeClr>
-          </a:lnRef>
-          <a:fillRef idx="1">
-            <a:schemeClr val="accent1"/>
-          </a:fillRef>
-          <a:effectRef idx="0">
-            <a:schemeClr val="accent1"/>
-          </a:effectRef>
-          <a:fontRef idx="minor">
-            <a:schemeClr val="lt1"/>
-          </a:fontRef>
-        </p:style>
-        <p:txBody>
-          <a:bodyPr rtlCol="0" anchor="ctr"/>
-          <a:lstStyle/>
-          <a:p>
-            <a:pPr algn="ctr"/>
-            <a:r>
-              <a:rPr lang="en-US" dirty="0">
-                <a:solidFill>
-                  <a:schemeClr val="tx1"/>
-                </a:solidFill>
-              </a:rPr>
-              <a:t>3-sigma Cutoff</a:t>
-            </a:r>
-          </a:p>
-        </p:txBody>
-      </p:sp>
-      <p:cxnSp>
-        <p:nvCxnSpPr>
-          <p:cNvPr id="32" name="Straight Arrow Connector 31">
-            <a:extLst>
-              <a:ext uri="{FF2B5EF4-FFF2-40B4-BE49-F238E27FC236}">
-                <a16:creationId xmlns:a16="http://schemas.microsoft.com/office/drawing/2014/main" id="{E89CDE74-1321-B4B1-BA31-65E6B697BA10}"/>
-              </a:ext>
-            </a:extLst>
-          </p:cNvPr>
-          <p:cNvCxnSpPr>
-            <a:cxnSpLocks/>
-          </p:cNvCxnSpPr>
-          <p:nvPr/>
-        </p:nvCxnSpPr>
-        <p:spPr>
-          <a:xfrm>
-            <a:off x="4822760" y="4468284"/>
-            <a:ext cx="0" cy="420414"/>
-          </a:xfrm>
-          <a:prstGeom prst="straightConnector1">
-            <a:avLst/>
-          </a:prstGeom>
-          <a:ln>
-            <a:tailEnd type="triangle"/>
-          </a:ln>
-        </p:spPr>
-        <p:style>
-          <a:lnRef idx="1">
-            <a:schemeClr val="accent1"/>
-          </a:lnRef>
-          <a:fillRef idx="0">
-            <a:schemeClr val="accent1"/>
-          </a:fillRef>
-          <a:effectRef idx="0">
-            <a:schemeClr val="accent1"/>
-          </a:effectRef>
-          <a:fontRef idx="minor">
-            <a:schemeClr val="tx1"/>
-          </a:fontRef>
-        </p:style>
-      </p:cxnSp>
-      <p:sp>
-        <p:nvSpPr>
-          <p:cNvPr id="33" name="Rectangle 32">
-            <a:extLst>
-              <a:ext uri="{FF2B5EF4-FFF2-40B4-BE49-F238E27FC236}">
-                <a16:creationId xmlns:a16="http://schemas.microsoft.com/office/drawing/2014/main" id="{BDD4FD88-533A-94C4-A66D-740563E7E09D}"/>
-              </a:ext>
-            </a:extLst>
-          </p:cNvPr>
-          <p:cNvSpPr/>
-          <p:nvPr/>
-        </p:nvSpPr>
-        <p:spPr>
-          <a:xfrm>
-            <a:off x="3896157" y="6144453"/>
-            <a:ext cx="1853206" cy="631178"/>
-          </a:xfrm>
-          <a:prstGeom prst="rect">
-            <a:avLst/>
-          </a:prstGeom>
-          <a:noFill/>
-          <a:ln>
-            <a:solidFill>
-              <a:schemeClr val="accent1">
-                <a:lumMod val="60000"/>
-                <a:lumOff val="40000"/>
-              </a:schemeClr>
-            </a:solidFill>
-          </a:ln>
-        </p:spPr>
-        <p:style>
-          <a:lnRef idx="2">
-            <a:schemeClr val="accent1">
-              <a:shade val="15000"/>
-            </a:schemeClr>
-          </a:lnRef>
-          <a:fillRef idx="1">
-            <a:schemeClr val="accent1"/>
-          </a:fillRef>
-          <a:effectRef idx="0">
-            <a:schemeClr val="accent1"/>
-          </a:effectRef>
-          <a:fontRef idx="minor">
-            <a:schemeClr val="lt1"/>
-          </a:fontRef>
-        </p:style>
-        <p:txBody>
-          <a:bodyPr rtlCol="0" anchor="ctr"/>
-          <a:lstStyle/>
-          <a:p>
-            <a:pPr algn="ctr"/>
-            <a:r>
-              <a:rPr lang="en-US" dirty="0">
-                <a:solidFill>
-                  <a:schemeClr val="tx1"/>
-                </a:solidFill>
-              </a:rPr>
-              <a:t>Kalman Filter</a:t>
-            </a:r>
-          </a:p>
-        </p:txBody>
-      </p:sp>
-      <p:cxnSp>
-        <p:nvCxnSpPr>
-          <p:cNvPr id="34" name="Straight Arrow Connector 33">
-            <a:extLst>
-              <a:ext uri="{FF2B5EF4-FFF2-40B4-BE49-F238E27FC236}">
-                <a16:creationId xmlns:a16="http://schemas.microsoft.com/office/drawing/2014/main" id="{1515954D-C0FA-2BB0-7124-92877C114C9A}"/>
-              </a:ext>
-            </a:extLst>
-          </p:cNvPr>
-          <p:cNvCxnSpPr>
-            <a:cxnSpLocks/>
-          </p:cNvCxnSpPr>
-          <p:nvPr/>
-        </p:nvCxnSpPr>
-        <p:spPr>
-          <a:xfrm>
-            <a:off x="4822760" y="5648953"/>
-            <a:ext cx="0" cy="420414"/>
+            <a:off x="6040439" y="4768365"/>
+            <a:ext cx="741749" cy="430027"/>
           </a:xfrm>
           <a:prstGeom prst="straightConnector1">
             <a:avLst/>

</xml_diff>